<commit_message>
correct typos in slides of wk1
</commit_message>
<xml_diff>
--- a/Lectures2024/CITS5503CloudComputingIntro_week1.pptx
+++ b/Lectures2024/CITS5503CloudComputingIntro_week1.pptx
@@ -296,7 +296,7 @@
   <pc:docChgLst>
     <pc:chgData name="张 智" userId="36bdf691fd3510be" providerId="LiveId" clId="{D05EFBDE-8E17-4BF0-9C9C-A20410AB5915}"/>
     <pc:docChg chg="undo custSel addSld delSld modSld sldOrd">
-      <pc:chgData name="张 智" userId="36bdf691fd3510be" providerId="LiveId" clId="{D05EFBDE-8E17-4BF0-9C9C-A20410AB5915}" dt="2024-07-22T15:11:33.234" v="5710" actId="20577"/>
+      <pc:chgData name="张 智" userId="36bdf691fd3510be" providerId="LiveId" clId="{D05EFBDE-8E17-4BF0-9C9C-A20410AB5915}" dt="2024-07-23T02:52:32.444" v="7638" actId="20577"/>
       <pc:docMkLst>
         <pc:docMk/>
       </pc:docMkLst>
@@ -322,6 +322,20 @@
           </ac:spMkLst>
         </pc:spChg>
       </pc:sldChg>
+      <pc:sldChg chg="modNotesTx">
+        <pc:chgData name="张 智" userId="36bdf691fd3510be" providerId="LiveId" clId="{D05EFBDE-8E17-4BF0-9C9C-A20410AB5915}" dt="2024-07-23T02:52:32.444" v="7638" actId="20577"/>
+        <pc:sldMkLst>
+          <pc:docMk/>
+          <pc:sldMk cId="1068746973" sldId="268"/>
+        </pc:sldMkLst>
+      </pc:sldChg>
+      <pc:sldChg chg="modNotesTx">
+        <pc:chgData name="张 智" userId="36bdf691fd3510be" providerId="LiveId" clId="{D05EFBDE-8E17-4BF0-9C9C-A20410AB5915}" dt="2024-07-23T02:16:35.110" v="5956" actId="20577"/>
+        <pc:sldMkLst>
+          <pc:docMk/>
+          <pc:sldMk cId="0" sldId="270"/>
+        </pc:sldMkLst>
+      </pc:sldChg>
       <pc:sldChg chg="modSp mod modNotesTx">
         <pc:chgData name="张 智" userId="36bdf691fd3510be" providerId="LiveId" clId="{D05EFBDE-8E17-4BF0-9C9C-A20410AB5915}" dt="2024-07-22T14:50:54.436" v="5483" actId="20577"/>
         <pc:sldMkLst>
@@ -352,6 +366,13 @@
           </ac:spMkLst>
         </pc:spChg>
       </pc:sldChg>
+      <pc:sldChg chg="modNotesTx">
+        <pc:chgData name="张 智" userId="36bdf691fd3510be" providerId="LiveId" clId="{D05EFBDE-8E17-4BF0-9C9C-A20410AB5915}" dt="2024-07-23T02:18:35.643" v="6185" actId="313"/>
+        <pc:sldMkLst>
+          <pc:docMk/>
+          <pc:sldMk cId="0" sldId="275"/>
+        </pc:sldMkLst>
+      </pc:sldChg>
       <pc:sldChg chg="addSp delSp modSp mod modNotesTx">
         <pc:chgData name="张 智" userId="36bdf691fd3510be" providerId="LiveId" clId="{D05EFBDE-8E17-4BF0-9C9C-A20410AB5915}" dt="2024-07-22T14:39:28.477" v="5201" actId="20577"/>
         <pc:sldMkLst>
@@ -526,6 +547,64 @@
             <ac:picMk id="25" creationId="{91E09107-2177-456B-8715-7A9E8A90A769}"/>
           </ac:picMkLst>
         </pc:picChg>
+      </pc:sldChg>
+      <pc:sldChg chg="modSp mod modNotesTx">
+        <pc:chgData name="张 智" userId="36bdf691fd3510be" providerId="LiveId" clId="{D05EFBDE-8E17-4BF0-9C9C-A20410AB5915}" dt="2024-07-23T02:34:24.141" v="7038" actId="20577"/>
+        <pc:sldMkLst>
+          <pc:docMk/>
+          <pc:sldMk cId="0" sldId="287"/>
+        </pc:sldMkLst>
+        <pc:spChg chg="mod">
+          <ac:chgData name="张 智" userId="36bdf691fd3510be" providerId="LiveId" clId="{D05EFBDE-8E17-4BF0-9C9C-A20410AB5915}" dt="2024-07-23T02:34:04.809" v="7027" actId="20577"/>
+          <ac:spMkLst>
+            <pc:docMk/>
+            <pc:sldMk cId="0" sldId="287"/>
+            <ac:spMk id="396" creationId="{00000000-0000-0000-0000-000000000000}"/>
+          </ac:spMkLst>
+        </pc:spChg>
+      </pc:sldChg>
+      <pc:sldChg chg="modNotesTx">
+        <pc:chgData name="张 智" userId="36bdf691fd3510be" providerId="LiveId" clId="{D05EFBDE-8E17-4BF0-9C9C-A20410AB5915}" dt="2024-07-23T02:02:47.881" v="5771" actId="20577"/>
+        <pc:sldMkLst>
+          <pc:docMk/>
+          <pc:sldMk cId="2725329858" sldId="288"/>
+        </pc:sldMkLst>
+      </pc:sldChg>
+      <pc:sldChg chg="modNotesTx">
+        <pc:chgData name="张 智" userId="36bdf691fd3510be" providerId="LiveId" clId="{D05EFBDE-8E17-4BF0-9C9C-A20410AB5915}" dt="2024-07-23T02:08:23.898" v="5850" actId="20577"/>
+        <pc:sldMkLst>
+          <pc:docMk/>
+          <pc:sldMk cId="23196158" sldId="290"/>
+        </pc:sldMkLst>
+      </pc:sldChg>
+      <pc:sldChg chg="modSp mod">
+        <pc:chgData name="张 智" userId="36bdf691fd3510be" providerId="LiveId" clId="{D05EFBDE-8E17-4BF0-9C9C-A20410AB5915}" dt="2024-07-23T02:36:43.080" v="7047" actId="5793"/>
+        <pc:sldMkLst>
+          <pc:docMk/>
+          <pc:sldMk cId="1580396754" sldId="291"/>
+        </pc:sldMkLst>
+        <pc:spChg chg="mod">
+          <ac:chgData name="张 智" userId="36bdf691fd3510be" providerId="LiveId" clId="{D05EFBDE-8E17-4BF0-9C9C-A20410AB5915}" dt="2024-07-23T02:36:43.080" v="7047" actId="5793"/>
+          <ac:spMkLst>
+            <pc:docMk/>
+            <pc:sldMk cId="1580396754" sldId="291"/>
+            <ac:spMk id="423" creationId="{00000000-0000-0000-0000-000000000000}"/>
+          </ac:spMkLst>
+        </pc:spChg>
+      </pc:sldChg>
+      <pc:sldChg chg="modNotesTx">
+        <pc:chgData name="张 智" userId="36bdf691fd3510be" providerId="LiveId" clId="{D05EFBDE-8E17-4BF0-9C9C-A20410AB5915}" dt="2024-07-23T02:38:22.888" v="7149" actId="20577"/>
+        <pc:sldMkLst>
+          <pc:docMk/>
+          <pc:sldMk cId="0" sldId="299"/>
+        </pc:sldMkLst>
+      </pc:sldChg>
+      <pc:sldChg chg="modNotesTx">
+        <pc:chgData name="张 智" userId="36bdf691fd3510be" providerId="LiveId" clId="{D05EFBDE-8E17-4BF0-9C9C-A20410AB5915}" dt="2024-07-23T02:39:43.351" v="7182" actId="20577"/>
+        <pc:sldMkLst>
+          <pc:docMk/>
+          <pc:sldMk cId="0" sldId="302"/>
+        </pc:sldMkLst>
       </pc:sldChg>
       <pc:sldChg chg="modSp mod modNotesTx">
         <pc:chgData name="张 智" userId="36bdf691fd3510be" providerId="LiveId" clId="{D05EFBDE-8E17-4BF0-9C9C-A20410AB5915}" dt="2024-07-22T14:40:23.173" v="5202" actId="20577"/>
@@ -768,7 +847,7 @@
         </pc:spChg>
       </pc:sldChg>
       <pc:sldChg chg="modSp mod modNotesTx">
-        <pc:chgData name="张 智" userId="36bdf691fd3510be" providerId="LiveId" clId="{D05EFBDE-8E17-4BF0-9C9C-A20410AB5915}" dt="2024-07-22T08:22:02.518" v="4491" actId="20577"/>
+        <pc:chgData name="张 智" userId="36bdf691fd3510be" providerId="LiveId" clId="{D05EFBDE-8E17-4BF0-9C9C-A20410AB5915}" dt="2024-07-23T02:41:36.504" v="7187" actId="20577"/>
         <pc:sldMkLst>
           <pc:docMk/>
           <pc:sldMk cId="1239153211" sldId="490"/>
@@ -1065,6 +1144,80 @@
             <ac:picMk id="7" creationId="{D83EF22A-4C53-486E-979E-B2316E166363}"/>
           </ac:picMkLst>
         </pc:picChg>
+      </pc:sldChg>
+      <pc:sldChg chg="modNotesTx">
+        <pc:chgData name="张 智" userId="36bdf691fd3510be" providerId="LiveId" clId="{D05EFBDE-8E17-4BF0-9C9C-A20410AB5915}" dt="2024-07-23T02:21:52.486" v="6263" actId="20577"/>
+        <pc:sldMkLst>
+          <pc:docMk/>
+          <pc:sldMk cId="1544810827" sldId="1363"/>
+        </pc:sldMkLst>
+      </pc:sldChg>
+      <pc:sldChg chg="modSp mod modNotesTx">
+        <pc:chgData name="张 智" userId="36bdf691fd3510be" providerId="LiveId" clId="{D05EFBDE-8E17-4BF0-9C9C-A20410AB5915}" dt="2024-07-23T02:10:16.460" v="5873" actId="20577"/>
+        <pc:sldMkLst>
+          <pc:docMk/>
+          <pc:sldMk cId="1485512427" sldId="1365"/>
+        </pc:sldMkLst>
+        <pc:spChg chg="mod">
+          <ac:chgData name="张 智" userId="36bdf691fd3510be" providerId="LiveId" clId="{D05EFBDE-8E17-4BF0-9C9C-A20410AB5915}" dt="2024-07-23T02:08:56.939" v="5852" actId="113"/>
+          <ac:spMkLst>
+            <pc:docMk/>
+            <pc:sldMk cId="1485512427" sldId="1365"/>
+            <ac:spMk id="418" creationId="{00000000-0000-0000-0000-000000000000}"/>
+          </ac:spMkLst>
+        </pc:spChg>
+      </pc:sldChg>
+      <pc:sldChg chg="modSp mod">
+        <pc:chgData name="张 智" userId="36bdf691fd3510be" providerId="LiveId" clId="{D05EFBDE-8E17-4BF0-9C9C-A20410AB5915}" dt="2024-07-23T02:09:07.676" v="5854" actId="113"/>
+        <pc:sldMkLst>
+          <pc:docMk/>
+          <pc:sldMk cId="2576467602" sldId="1366"/>
+        </pc:sldMkLst>
+        <pc:spChg chg="mod">
+          <ac:chgData name="张 智" userId="36bdf691fd3510be" providerId="LiveId" clId="{D05EFBDE-8E17-4BF0-9C9C-A20410AB5915}" dt="2024-07-23T02:09:07.676" v="5854" actId="113"/>
+          <ac:spMkLst>
+            <pc:docMk/>
+            <pc:sldMk cId="2576467602" sldId="1366"/>
+            <ac:spMk id="418" creationId="{00000000-0000-0000-0000-000000000000}"/>
+          </ac:spMkLst>
+        </pc:spChg>
+      </pc:sldChg>
+      <pc:sldChg chg="modSp mod">
+        <pc:chgData name="张 智" userId="36bdf691fd3510be" providerId="LiveId" clId="{D05EFBDE-8E17-4BF0-9C9C-A20410AB5915}" dt="2024-07-23T02:12:20.371" v="5874" actId="113"/>
+        <pc:sldMkLst>
+          <pc:docMk/>
+          <pc:sldMk cId="600696832" sldId="1367"/>
+        </pc:sldMkLst>
+        <pc:spChg chg="mod">
+          <ac:chgData name="张 智" userId="36bdf691fd3510be" providerId="LiveId" clId="{D05EFBDE-8E17-4BF0-9C9C-A20410AB5915}" dt="2024-07-23T02:12:20.371" v="5874" actId="113"/>
+          <ac:spMkLst>
+            <pc:docMk/>
+            <pc:sldMk cId="600696832" sldId="1367"/>
+            <ac:spMk id="418" creationId="{00000000-0000-0000-0000-000000000000}"/>
+          </ac:spMkLst>
+        </pc:spChg>
+      </pc:sldChg>
+      <pc:sldChg chg="modNotesTx">
+        <pc:chgData name="张 智" userId="36bdf691fd3510be" providerId="LiveId" clId="{D05EFBDE-8E17-4BF0-9C9C-A20410AB5915}" dt="2024-07-23T02:51:12.232" v="7633" actId="20577"/>
+        <pc:sldMkLst>
+          <pc:docMk/>
+          <pc:sldMk cId="3650811177" sldId="1371"/>
+        </pc:sldMkLst>
+      </pc:sldChg>
+      <pc:sldChg chg="modSp mod modNotesTx">
+        <pc:chgData name="张 智" userId="36bdf691fd3510be" providerId="LiveId" clId="{D05EFBDE-8E17-4BF0-9C9C-A20410AB5915}" dt="2024-07-23T02:45:07.476" v="7279" actId="20577"/>
+        <pc:sldMkLst>
+          <pc:docMk/>
+          <pc:sldMk cId="892066738" sldId="1373"/>
+        </pc:sldMkLst>
+        <pc:spChg chg="mod">
+          <ac:chgData name="张 智" userId="36bdf691fd3510be" providerId="LiveId" clId="{D05EFBDE-8E17-4BF0-9C9C-A20410AB5915}" dt="2024-07-23T02:44:19.790" v="7188" actId="20577"/>
+          <ac:spMkLst>
+            <pc:docMk/>
+            <pc:sldMk cId="892066738" sldId="1373"/>
+            <ac:spMk id="7" creationId="{85F180D1-C7EF-4A34-96CA-73A86A26F467}"/>
+          </ac:spMkLst>
+        </pc:spChg>
       </pc:sldChg>
       <pc:sldChg chg="add del">
         <pc:chgData name="张 智" userId="36bdf691fd3510be" providerId="LiveId" clId="{D05EFBDE-8E17-4BF0-9C9C-A20410AB5915}" dt="2024-07-17T04:48:20.721" v="669"/>
@@ -16113,7 +16266,7 @@
           <a:noFill/>
           <a:extLst>
             <a:ext uri="{909E8E84-426E-40dd-AFC4-6F175D3DCCD1}">
-              <a14:hiddenFill xmlns:a14="http://schemas.microsoft.com/office/drawing/2010/main" xmlns="">
+              <a14:hiddenFill xmlns="" xmlns:a14="http://schemas.microsoft.com/office/drawing/2010/main">
                 <a:solidFill>
                   <a:srgbClr val="FFFFFF"/>
                 </a:solidFill>
@@ -16523,7 +16676,7 @@
           <a:noFill/>
           <a:extLst>
             <a:ext uri="{909E8E84-426E-40dd-AFC4-6F175D3DCCD1}">
-              <a14:hiddenFill xmlns:a14="http://schemas.microsoft.com/office/drawing/2010/main" xmlns="">
+              <a14:hiddenFill xmlns="" xmlns:a14="http://schemas.microsoft.com/office/drawing/2010/main">
                 <a:solidFill>
                   <a:srgbClr val="FFFFFF"/>
                 </a:solidFill>
@@ -16570,7 +16723,7 @@
           <a:noFill/>
           <a:extLst>
             <a:ext uri="{909E8E84-426E-40dd-AFC4-6F175D3DCCD1}">
-              <a14:hiddenFill xmlns:a14="http://schemas.microsoft.com/office/drawing/2010/main" xmlns="">
+              <a14:hiddenFill xmlns="" xmlns:a14="http://schemas.microsoft.com/office/drawing/2010/main">
                 <a:solidFill>
                   <a:srgbClr val="FFFFFF"/>
                 </a:solidFill>
@@ -16617,7 +16770,7 @@
           <a:noFill/>
           <a:extLst>
             <a:ext uri="{909E8E84-426E-40dd-AFC4-6F175D3DCCD1}">
-              <a14:hiddenFill xmlns:a14="http://schemas.microsoft.com/office/drawing/2010/main" xmlns="">
+              <a14:hiddenFill xmlns="" xmlns:a14="http://schemas.microsoft.com/office/drawing/2010/main">
                 <a:solidFill>
                   <a:srgbClr val="FFFFFF"/>
                 </a:solidFill>
@@ -16664,7 +16817,7 @@
           <a:noFill/>
           <a:extLst>
             <a:ext uri="{909E8E84-426E-40dd-AFC4-6F175D3DCCD1}">
-              <a14:hiddenFill xmlns:a14="http://schemas.microsoft.com/office/drawing/2010/main" xmlns="">
+              <a14:hiddenFill xmlns="" xmlns:a14="http://schemas.microsoft.com/office/drawing/2010/main">
                 <a:solidFill>
                   <a:srgbClr val="FFFFFF"/>
                 </a:solidFill>
@@ -16711,7 +16864,7 @@
           <a:noFill/>
           <a:extLst>
             <a:ext uri="{909E8E84-426E-40dd-AFC4-6F175D3DCCD1}">
-              <a14:hiddenFill xmlns:a14="http://schemas.microsoft.com/office/drawing/2010/main" xmlns="">
+              <a14:hiddenFill xmlns="" xmlns:a14="http://schemas.microsoft.com/office/drawing/2010/main">
                 <a:solidFill>
                   <a:srgbClr val="FFFFFF"/>
                 </a:solidFill>
@@ -21135,7 +21288,7 @@
           </a:ln>
           <a:extLst>
             <a:ext uri="{C572A759-6A51-4108-AA02-DFA0A04FC94B}">
-              <ma14:wrappingTextBoxFlag xmlns:ma14="http://schemas.microsoft.com/office/mac/drawingml/2011/main" xmlns:a14="http://schemas.microsoft.com/office/drawing/2010/main" xmlns:m="http://schemas.openxmlformats.org/officeDocument/2006/math" xmlns="" val="1"/>
+              <ma14:wrappingTextBoxFlag xmlns="" xmlns:m="http://schemas.openxmlformats.org/officeDocument/2006/math" xmlns:a14="http://schemas.microsoft.com/office/drawing/2010/main" xmlns:ma14="http://schemas.microsoft.com/office/mac/drawingml/2011/main" val="1"/>
             </a:ext>
           </a:extLst>
         </p:spPr>
@@ -21704,7 +21857,7 @@
           </a:ln>
           <a:extLst>
             <a:ext uri="{C572A759-6A51-4108-AA02-DFA0A04FC94B}">
-              <ma14:wrappingTextBoxFlag xmlns:ma14="http://schemas.microsoft.com/office/mac/drawingml/2011/main" xmlns:a14="http://schemas.microsoft.com/office/drawing/2010/main" xmlns:m="http://schemas.openxmlformats.org/officeDocument/2006/math" xmlns="" val="1"/>
+              <ma14:wrappingTextBoxFlag xmlns="" xmlns:m="http://schemas.openxmlformats.org/officeDocument/2006/math" xmlns:a14="http://schemas.microsoft.com/office/drawing/2010/main" xmlns:ma14="http://schemas.microsoft.com/office/mac/drawingml/2011/main" val="1"/>
             </a:ext>
           </a:extLst>
         </p:spPr>
@@ -21960,10 +22113,10 @@
               <a:defRPr sz="2200"/>
             </a:pPr>
             <a:r>
-              <a:rPr sz="2000" dirty="0"/>
+              <a:rPr sz="2000" b="1" dirty="0"/>
               <a:t>On-demand self service</a:t>
             </a:r>
-            <a:endParaRPr lang="en-AU" sz="2000" dirty="0"/>
+            <a:endParaRPr lang="en-AU" sz="2000" b="1" dirty="0"/>
           </a:p>
           <a:p>
             <a:pPr lvl="2">
@@ -21986,10 +22139,10 @@
               <a:defRPr sz="2200"/>
             </a:pPr>
             <a:r>
-              <a:rPr sz="2000" dirty="0"/>
+              <a:rPr sz="2000" b="1" dirty="0"/>
               <a:t>Broad network access</a:t>
             </a:r>
-            <a:endParaRPr lang="en-AU" sz="2000" dirty="0"/>
+            <a:endParaRPr lang="en-AU" sz="2000" b="1" dirty="0"/>
           </a:p>
           <a:p>
             <a:pPr lvl="2">
@@ -22034,7 +22187,7 @@
           </a:ln>
           <a:extLst>
             <a:ext uri="{C572A759-6A51-4108-AA02-DFA0A04FC94B}">
-              <ma14:wrappingTextBoxFlag xmlns:ma14="http://schemas.microsoft.com/office/mac/drawingml/2011/main" xmlns:a14="http://schemas.microsoft.com/office/drawing/2010/main" xmlns:m="http://schemas.openxmlformats.org/officeDocument/2006/math" xmlns="" val="1"/>
+              <ma14:wrappingTextBoxFlag xmlns="" xmlns:m="http://schemas.openxmlformats.org/officeDocument/2006/math" xmlns:a14="http://schemas.microsoft.com/office/drawing/2010/main" xmlns:ma14="http://schemas.microsoft.com/office/mac/drawingml/2011/main" val="1"/>
             </a:ext>
           </a:extLst>
         </p:spPr>
@@ -22314,10 +22467,10 @@
               <a:defRPr sz="2200"/>
             </a:pPr>
             <a:r>
-              <a:rPr sz="2000" dirty="0"/>
+              <a:rPr sz="2000" b="1" dirty="0"/>
               <a:t>Resource pooling</a:t>
             </a:r>
-            <a:endParaRPr lang="en-AU" sz="2000" dirty="0"/>
+            <a:endParaRPr lang="en-AU" sz="2000" b="1" dirty="0"/>
           </a:p>
           <a:p>
             <a:pPr lvl="2">
@@ -22340,7 +22493,7 @@
               <a:defRPr sz="2200"/>
             </a:pPr>
             <a:r>
-              <a:rPr sz="2000" dirty="0"/>
+              <a:rPr sz="2000" b="1" dirty="0"/>
               <a:t>Rapid elasticity</a:t>
             </a:r>
           </a:p>
@@ -22378,7 +22531,7 @@
           </a:ln>
           <a:extLst>
             <a:ext uri="{C572A759-6A51-4108-AA02-DFA0A04FC94B}">
-              <ma14:wrappingTextBoxFlag xmlns:ma14="http://schemas.microsoft.com/office/mac/drawingml/2011/main" xmlns:a14="http://schemas.microsoft.com/office/drawing/2010/main" xmlns:m="http://schemas.openxmlformats.org/officeDocument/2006/math" xmlns="" val="1"/>
+              <ma14:wrappingTextBoxFlag xmlns="" xmlns:m="http://schemas.openxmlformats.org/officeDocument/2006/math" xmlns:a14="http://schemas.microsoft.com/office/drawing/2010/main" xmlns:ma14="http://schemas.microsoft.com/office/mac/drawingml/2011/main" val="1"/>
             </a:ext>
           </a:extLst>
         </p:spPr>
@@ -22685,10 +22838,10 @@
               <a:defRPr sz="2200"/>
             </a:pPr>
             <a:r>
-              <a:rPr sz="2000" dirty="0"/>
+              <a:rPr sz="2000" b="1" dirty="0"/>
               <a:t>Measured service</a:t>
             </a:r>
-            <a:endParaRPr lang="en-AU" sz="2000" dirty="0"/>
+            <a:endParaRPr lang="en-AU" sz="2000" b="1" dirty="0"/>
           </a:p>
           <a:p>
             <a:pPr lvl="2">
@@ -22733,7 +22886,7 @@
           </a:ln>
           <a:extLst>
             <a:ext uri="{C572A759-6A51-4108-AA02-DFA0A04FC94B}">
-              <ma14:wrappingTextBoxFlag xmlns:ma14="http://schemas.microsoft.com/office/mac/drawingml/2011/main" xmlns:a14="http://schemas.microsoft.com/office/drawing/2010/main" xmlns:m="http://schemas.openxmlformats.org/officeDocument/2006/math" xmlns="" val="1"/>
+              <ma14:wrappingTextBoxFlag xmlns="" xmlns:m="http://schemas.openxmlformats.org/officeDocument/2006/math" xmlns:a14="http://schemas.microsoft.com/office/drawing/2010/main" xmlns:ma14="http://schemas.microsoft.com/office/mac/drawingml/2011/main" val="1"/>
             </a:ext>
           </a:extLst>
         </p:spPr>
@@ -23096,7 +23249,7 @@
           </a:ln>
           <a:extLst>
             <a:ext uri="{C572A759-6A51-4108-AA02-DFA0A04FC94B}">
-              <ma14:wrappingTextBoxFlag xmlns:ma14="http://schemas.microsoft.com/office/mac/drawingml/2011/main" xmlns:a14="http://schemas.microsoft.com/office/drawing/2010/main" xmlns:m="http://schemas.openxmlformats.org/officeDocument/2006/math" xmlns="" val="1"/>
+              <ma14:wrappingTextBoxFlag xmlns="" xmlns:m="http://schemas.openxmlformats.org/officeDocument/2006/math" xmlns:a14="http://schemas.microsoft.com/office/drawing/2010/main" xmlns:ma14="http://schemas.microsoft.com/office/mac/drawingml/2011/main" val="1"/>
             </a:ext>
           </a:extLst>
         </p:spPr>
@@ -23144,7 +23297,7 @@
           </a:ln>
           <a:extLst>
             <a:ext uri="{C572A759-6A51-4108-AA02-DFA0A04FC94B}">
-              <ma14:wrappingTextBoxFlag xmlns:ma14="http://schemas.microsoft.com/office/mac/drawingml/2011/main" xmlns:a14="http://schemas.microsoft.com/office/drawing/2010/main" xmlns:m="http://schemas.openxmlformats.org/officeDocument/2006/math" xmlns="" val="1"/>
+              <ma14:wrappingTextBoxFlag xmlns="" xmlns:m="http://schemas.openxmlformats.org/officeDocument/2006/math" xmlns:a14="http://schemas.microsoft.com/office/drawing/2010/main" xmlns:ma14="http://schemas.microsoft.com/office/mac/drawingml/2011/main" val="1"/>
             </a:ext>
           </a:extLst>
         </p:spPr>
@@ -23192,7 +23345,7 @@
           </a:ln>
           <a:extLst>
             <a:ext uri="{C572A759-6A51-4108-AA02-DFA0A04FC94B}">
-              <ma14:wrappingTextBoxFlag xmlns:ma14="http://schemas.microsoft.com/office/mac/drawingml/2011/main" xmlns:a14="http://schemas.microsoft.com/office/drawing/2010/main" xmlns:m="http://schemas.openxmlformats.org/officeDocument/2006/math" xmlns="" val="1"/>
+              <ma14:wrappingTextBoxFlag xmlns="" xmlns:m="http://schemas.openxmlformats.org/officeDocument/2006/math" xmlns:a14="http://schemas.microsoft.com/office/drawing/2010/main" xmlns:ma14="http://schemas.microsoft.com/office/mac/drawingml/2011/main" val="1"/>
             </a:ext>
           </a:extLst>
         </p:spPr>
@@ -23664,7 +23817,7 @@
           </a:ln>
           <a:extLst>
             <a:ext uri="{C572A759-6A51-4108-AA02-DFA0A04FC94B}">
-              <ma14:wrappingTextBoxFlag xmlns:ma14="http://schemas.microsoft.com/office/mac/drawingml/2011/main" xmlns:a14="http://schemas.microsoft.com/office/drawing/2010/main" xmlns:m="http://schemas.openxmlformats.org/officeDocument/2006/math" xmlns="" val="1"/>
+              <ma14:wrappingTextBoxFlag xmlns="" xmlns:m="http://schemas.openxmlformats.org/officeDocument/2006/math" xmlns:a14="http://schemas.microsoft.com/office/drawing/2010/main" xmlns:ma14="http://schemas.microsoft.com/office/mac/drawingml/2011/main" val="1"/>
             </a:ext>
           </a:extLst>
         </p:spPr>
@@ -23730,7 +23883,7 @@
           </a:ln>
           <a:extLst>
             <a:ext uri="{C572A759-6A51-4108-AA02-DFA0A04FC94B}">
-              <ma14:wrappingTextBoxFlag xmlns:ma14="http://schemas.microsoft.com/office/mac/drawingml/2011/main" xmlns:a14="http://schemas.microsoft.com/office/drawing/2010/main" xmlns:m="http://schemas.openxmlformats.org/officeDocument/2006/math" xmlns="" val="1"/>
+              <ma14:wrappingTextBoxFlag xmlns="" xmlns:m="http://schemas.openxmlformats.org/officeDocument/2006/math" xmlns:a14="http://schemas.microsoft.com/office/drawing/2010/main" xmlns:ma14="http://schemas.microsoft.com/office/mac/drawingml/2011/main" val="1"/>
             </a:ext>
           </a:extLst>
         </p:spPr>
@@ -23810,7 +23963,7 @@
           </a:ln>
           <a:extLst>
             <a:ext uri="{C572A759-6A51-4108-AA02-DFA0A04FC94B}">
-              <ma14:wrappingTextBoxFlag xmlns:ma14="http://schemas.microsoft.com/office/mac/drawingml/2011/main" xmlns:a14="http://schemas.microsoft.com/office/drawing/2010/main" xmlns:m="http://schemas.openxmlformats.org/officeDocument/2006/math" xmlns="" val="1"/>
+              <ma14:wrappingTextBoxFlag xmlns="" xmlns:m="http://schemas.openxmlformats.org/officeDocument/2006/math" xmlns:a14="http://schemas.microsoft.com/office/drawing/2010/main" xmlns:ma14="http://schemas.microsoft.com/office/mac/drawingml/2011/main" val="1"/>
             </a:ext>
           </a:extLst>
         </p:spPr>
@@ -23895,7 +24048,7 @@
           </a:ln>
           <a:extLst>
             <a:ext uri="{C572A759-6A51-4108-AA02-DFA0A04FC94B}">
-              <ma14:wrappingTextBoxFlag xmlns:ma14="http://schemas.microsoft.com/office/mac/drawingml/2011/main" xmlns:a14="http://schemas.microsoft.com/office/drawing/2010/main" xmlns:m="http://schemas.openxmlformats.org/officeDocument/2006/math" xmlns="" val="1"/>
+              <ma14:wrappingTextBoxFlag xmlns="" xmlns:m="http://schemas.openxmlformats.org/officeDocument/2006/math" xmlns:a14="http://schemas.microsoft.com/office/drawing/2010/main" xmlns:ma14="http://schemas.microsoft.com/office/mac/drawingml/2011/main" val="1"/>
             </a:ext>
           </a:extLst>
         </p:spPr>
@@ -24725,7 +24878,7 @@
           </a:ln>
           <a:extLst>
             <a:ext uri="{C572A759-6A51-4108-AA02-DFA0A04FC94B}">
-              <ma14:wrappingTextBoxFlag xmlns:ma14="http://schemas.microsoft.com/office/mac/drawingml/2011/main" xmlns:a14="http://schemas.microsoft.com/office/drawing/2010/main" xmlns:m="http://schemas.openxmlformats.org/officeDocument/2006/math" xmlns="" val="1"/>
+              <ma14:wrappingTextBoxFlag xmlns="" xmlns:m="http://schemas.openxmlformats.org/officeDocument/2006/math" xmlns:a14="http://schemas.microsoft.com/office/drawing/2010/main" xmlns:ma14="http://schemas.microsoft.com/office/mac/drawingml/2011/main" val="1"/>
             </a:ext>
           </a:extLst>
         </p:spPr>
@@ -24773,7 +24926,7 @@
           </a:ln>
           <a:extLst>
             <a:ext uri="{C572A759-6A51-4108-AA02-DFA0A04FC94B}">
-              <ma14:wrappingTextBoxFlag xmlns:ma14="http://schemas.microsoft.com/office/mac/drawingml/2011/main" xmlns:a14="http://schemas.microsoft.com/office/drawing/2010/main" xmlns:m="http://schemas.openxmlformats.org/officeDocument/2006/math" xmlns="" val="1"/>
+              <ma14:wrappingTextBoxFlag xmlns="" xmlns:m="http://schemas.openxmlformats.org/officeDocument/2006/math" xmlns:a14="http://schemas.microsoft.com/office/drawing/2010/main" xmlns:ma14="http://schemas.microsoft.com/office/mac/drawingml/2011/main" val="1"/>
             </a:ext>
           </a:extLst>
         </p:spPr>
@@ -24821,7 +24974,7 @@
           </a:ln>
           <a:extLst>
             <a:ext uri="{C572A759-6A51-4108-AA02-DFA0A04FC94B}">
-              <ma14:wrappingTextBoxFlag xmlns:ma14="http://schemas.microsoft.com/office/mac/drawingml/2011/main" xmlns:a14="http://schemas.microsoft.com/office/drawing/2010/main" xmlns:m="http://schemas.openxmlformats.org/officeDocument/2006/math" xmlns="" val="1"/>
+              <ma14:wrappingTextBoxFlag xmlns="" xmlns:m="http://schemas.openxmlformats.org/officeDocument/2006/math" xmlns:a14="http://schemas.microsoft.com/office/drawing/2010/main" xmlns:ma14="http://schemas.microsoft.com/office/mac/drawingml/2011/main" val="1"/>
             </a:ext>
           </a:extLst>
         </p:spPr>
@@ -24869,7 +25022,7 @@
           </a:ln>
           <a:extLst>
             <a:ext uri="{C572A759-6A51-4108-AA02-DFA0A04FC94B}">
-              <ma14:wrappingTextBoxFlag xmlns:ma14="http://schemas.microsoft.com/office/mac/drawingml/2011/main" xmlns:a14="http://schemas.microsoft.com/office/drawing/2010/main" xmlns:m="http://schemas.openxmlformats.org/officeDocument/2006/math" xmlns="" val="1"/>
+              <ma14:wrappingTextBoxFlag xmlns="" xmlns:m="http://schemas.openxmlformats.org/officeDocument/2006/math" xmlns:a14="http://schemas.microsoft.com/office/drawing/2010/main" xmlns:ma14="http://schemas.microsoft.com/office/mac/drawingml/2011/main" val="1"/>
             </a:ext>
           </a:extLst>
         </p:spPr>
@@ -25169,7 +25322,7 @@
           </a:ln>
           <a:extLst>
             <a:ext uri="{C572A759-6A51-4108-AA02-DFA0A04FC94B}">
-              <ma14:wrappingTextBoxFlag xmlns:ma14="http://schemas.microsoft.com/office/mac/drawingml/2011/main" xmlns:a14="http://schemas.microsoft.com/office/drawing/2010/main" xmlns:m="http://schemas.openxmlformats.org/officeDocument/2006/math" xmlns="" val="1"/>
+              <ma14:wrappingTextBoxFlag xmlns="" xmlns:m="http://schemas.openxmlformats.org/officeDocument/2006/math" xmlns:a14="http://schemas.microsoft.com/office/drawing/2010/main" xmlns:ma14="http://schemas.microsoft.com/office/mac/drawingml/2011/main" val="1"/>
             </a:ext>
           </a:extLst>
         </p:spPr>
@@ -25244,7 +25397,7 @@
           </a:ln>
           <a:extLst>
             <a:ext uri="{C572A759-6A51-4108-AA02-DFA0A04FC94B}">
-              <ma14:wrappingTextBoxFlag xmlns:ma14="http://schemas.microsoft.com/office/mac/drawingml/2011/main" xmlns:a14="http://schemas.microsoft.com/office/drawing/2010/main" xmlns:m="http://schemas.openxmlformats.org/officeDocument/2006/math" xmlns="" val="1"/>
+              <ma14:wrappingTextBoxFlag xmlns="" xmlns:m="http://schemas.openxmlformats.org/officeDocument/2006/math" xmlns:a14="http://schemas.microsoft.com/office/drawing/2010/main" xmlns:ma14="http://schemas.microsoft.com/office/mac/drawingml/2011/main" val="1"/>
             </a:ext>
           </a:extLst>
         </p:spPr>
@@ -25298,7 +25451,7 @@
           </a:ln>
           <a:extLst>
             <a:ext uri="{C572A759-6A51-4108-AA02-DFA0A04FC94B}">
-              <ma14:wrappingTextBoxFlag xmlns:ma14="http://schemas.microsoft.com/office/mac/drawingml/2011/main" xmlns:a14="http://schemas.microsoft.com/office/drawing/2010/main" xmlns:m="http://schemas.openxmlformats.org/officeDocument/2006/math" xmlns="" val="1"/>
+              <ma14:wrappingTextBoxFlag xmlns="" xmlns:m="http://schemas.openxmlformats.org/officeDocument/2006/math" xmlns:a14="http://schemas.microsoft.com/office/drawing/2010/main" xmlns:ma14="http://schemas.microsoft.com/office/mac/drawingml/2011/main" val="1"/>
             </a:ext>
           </a:extLst>
         </p:spPr>
@@ -25648,7 +25801,7 @@
           </a:ln>
           <a:extLst>
             <a:ext uri="{C572A759-6A51-4108-AA02-DFA0A04FC94B}">
-              <ma14:wrappingTextBoxFlag xmlns:ma14="http://schemas.microsoft.com/office/mac/drawingml/2011/main" xmlns:a14="http://schemas.microsoft.com/office/drawing/2010/main" xmlns:m="http://schemas.openxmlformats.org/officeDocument/2006/math" xmlns="" val="1"/>
+              <ma14:wrappingTextBoxFlag xmlns="" xmlns:m="http://schemas.openxmlformats.org/officeDocument/2006/math" xmlns:a14="http://schemas.microsoft.com/office/drawing/2010/main" xmlns:ma14="http://schemas.microsoft.com/office/mac/drawingml/2011/main" val="1"/>
             </a:ext>
           </a:extLst>
         </p:spPr>
@@ -25750,7 +25903,7 @@
           </a:ln>
           <a:extLst>
             <a:ext uri="{C572A759-6A51-4108-AA02-DFA0A04FC94B}">
-              <ma14:wrappingTextBoxFlag xmlns:ma14="http://schemas.microsoft.com/office/mac/drawingml/2011/main" xmlns:a14="http://schemas.microsoft.com/office/drawing/2010/main" xmlns:m="http://schemas.openxmlformats.org/officeDocument/2006/math" xmlns="" val="1"/>
+              <ma14:wrappingTextBoxFlag xmlns="" xmlns:m="http://schemas.openxmlformats.org/officeDocument/2006/math" xmlns:a14="http://schemas.microsoft.com/office/drawing/2010/main" xmlns:ma14="http://schemas.microsoft.com/office/mac/drawingml/2011/main" val="1"/>
             </a:ext>
           </a:extLst>
         </p:spPr>
@@ -25959,7 +26112,7 @@
           </a:ln>
           <a:extLst>
             <a:ext uri="{C572A759-6A51-4108-AA02-DFA0A04FC94B}">
-              <ma14:wrappingTextBoxFlag xmlns:ma14="http://schemas.microsoft.com/office/mac/drawingml/2011/main" xmlns:a14="http://schemas.microsoft.com/office/drawing/2010/main" xmlns:m="http://schemas.openxmlformats.org/officeDocument/2006/math" xmlns="" val="1"/>
+              <ma14:wrappingTextBoxFlag xmlns="" xmlns:m="http://schemas.openxmlformats.org/officeDocument/2006/math" xmlns:a14="http://schemas.microsoft.com/office/drawing/2010/main" xmlns:ma14="http://schemas.microsoft.com/office/mac/drawingml/2011/main" val="1"/>
             </a:ext>
           </a:extLst>
         </p:spPr>
@@ -26186,7 +26339,7 @@
           </a:ln>
           <a:extLst>
             <a:ext uri="{C572A759-6A51-4108-AA02-DFA0A04FC94B}">
-              <ma14:wrappingTextBoxFlag xmlns:ma14="http://schemas.microsoft.com/office/mac/drawingml/2011/main" xmlns:a14="http://schemas.microsoft.com/office/drawing/2010/main" xmlns:m="http://schemas.openxmlformats.org/officeDocument/2006/math" xmlns="" val="1"/>
+              <ma14:wrappingTextBoxFlag xmlns="" xmlns:m="http://schemas.openxmlformats.org/officeDocument/2006/math" xmlns:a14="http://schemas.microsoft.com/office/drawing/2010/main" xmlns:ma14="http://schemas.microsoft.com/office/mac/drawingml/2011/main" val="1"/>
             </a:ext>
           </a:extLst>
         </p:spPr>
@@ -26536,7 +26689,7 @@
           </a:ln>
           <a:extLst>
             <a:ext uri="{C572A759-6A51-4108-AA02-DFA0A04FC94B}">
-              <ma14:wrappingTextBoxFlag xmlns:ma14="http://schemas.microsoft.com/office/mac/drawingml/2011/main" xmlns:a14="http://schemas.microsoft.com/office/drawing/2010/main" xmlns:m="http://schemas.openxmlformats.org/officeDocument/2006/math" xmlns="" val="1"/>
+              <ma14:wrappingTextBoxFlag xmlns="" xmlns:m="http://schemas.openxmlformats.org/officeDocument/2006/math" xmlns:a14="http://schemas.microsoft.com/office/drawing/2010/main" xmlns:ma14="http://schemas.microsoft.com/office/mac/drawingml/2011/main" val="1"/>
             </a:ext>
           </a:extLst>
         </p:spPr>
@@ -26584,7 +26737,7 @@
           </a:ln>
           <a:extLst>
             <a:ext uri="{C572A759-6A51-4108-AA02-DFA0A04FC94B}">
-              <ma14:wrappingTextBoxFlag xmlns:ma14="http://schemas.microsoft.com/office/mac/drawingml/2011/main" xmlns:a14="http://schemas.microsoft.com/office/drawing/2010/main" xmlns:m="http://schemas.openxmlformats.org/officeDocument/2006/math" xmlns="" val="1"/>
+              <ma14:wrappingTextBoxFlag xmlns="" xmlns:m="http://schemas.openxmlformats.org/officeDocument/2006/math" xmlns:a14="http://schemas.microsoft.com/office/drawing/2010/main" xmlns:ma14="http://schemas.microsoft.com/office/mac/drawingml/2011/main" val="1"/>
             </a:ext>
           </a:extLst>
         </p:spPr>
@@ -26632,7 +26785,7 @@
           </a:ln>
           <a:extLst>
             <a:ext uri="{C572A759-6A51-4108-AA02-DFA0A04FC94B}">
-              <ma14:wrappingTextBoxFlag xmlns:ma14="http://schemas.microsoft.com/office/mac/drawingml/2011/main" xmlns:a14="http://schemas.microsoft.com/office/drawing/2010/main" xmlns:m="http://schemas.openxmlformats.org/officeDocument/2006/math" xmlns="" val="1"/>
+              <ma14:wrappingTextBoxFlag xmlns="" xmlns:m="http://schemas.openxmlformats.org/officeDocument/2006/math" xmlns:a14="http://schemas.microsoft.com/office/drawing/2010/main" xmlns:ma14="http://schemas.microsoft.com/office/mac/drawingml/2011/main" val="1"/>
             </a:ext>
           </a:extLst>
         </p:spPr>
@@ -26680,7 +26833,7 @@
           </a:ln>
           <a:extLst>
             <a:ext uri="{C572A759-6A51-4108-AA02-DFA0A04FC94B}">
-              <ma14:wrappingTextBoxFlag xmlns:ma14="http://schemas.microsoft.com/office/mac/drawingml/2011/main" xmlns:a14="http://schemas.microsoft.com/office/drawing/2010/main" xmlns:m="http://schemas.openxmlformats.org/officeDocument/2006/math" xmlns="" val="1"/>
+              <ma14:wrappingTextBoxFlag xmlns="" xmlns:m="http://schemas.openxmlformats.org/officeDocument/2006/math" xmlns:a14="http://schemas.microsoft.com/office/drawing/2010/main" xmlns:ma14="http://schemas.microsoft.com/office/mac/drawingml/2011/main" val="1"/>
             </a:ext>
           </a:extLst>
         </p:spPr>
@@ -26728,7 +26881,7 @@
           </a:ln>
           <a:extLst>
             <a:ext uri="{C572A759-6A51-4108-AA02-DFA0A04FC94B}">
-              <ma14:wrappingTextBoxFlag xmlns:ma14="http://schemas.microsoft.com/office/mac/drawingml/2011/main" xmlns:a14="http://schemas.microsoft.com/office/drawing/2010/main" xmlns:m="http://schemas.openxmlformats.org/officeDocument/2006/math" xmlns="" val="1"/>
+              <ma14:wrappingTextBoxFlag xmlns="" xmlns:m="http://schemas.openxmlformats.org/officeDocument/2006/math" xmlns:a14="http://schemas.microsoft.com/office/drawing/2010/main" xmlns:ma14="http://schemas.microsoft.com/office/mac/drawingml/2011/main" val="1"/>
             </a:ext>
           </a:extLst>
         </p:spPr>
@@ -27681,7 +27834,7 @@
           </a:ln>
           <a:extLst>
             <a:ext uri="{C572A759-6A51-4108-AA02-DFA0A04FC94B}">
-              <ma14:wrappingTextBoxFlag xmlns:ma14="http://schemas.microsoft.com/office/mac/drawingml/2011/main" xmlns:a14="http://schemas.microsoft.com/office/drawing/2010/main" xmlns:m="http://schemas.openxmlformats.org/officeDocument/2006/math" xmlns="" val="1"/>
+              <ma14:wrappingTextBoxFlag xmlns="" xmlns:m="http://schemas.openxmlformats.org/officeDocument/2006/math" xmlns:a14="http://schemas.microsoft.com/office/drawing/2010/main" xmlns:ma14="http://schemas.microsoft.com/office/mac/drawingml/2011/main" val="1"/>
             </a:ext>
           </a:extLst>
         </p:spPr>
@@ -27998,7 +28151,7 @@
           </a:ln>
           <a:extLst>
             <a:ext uri="{C572A759-6A51-4108-AA02-DFA0A04FC94B}">
-              <ma14:wrappingTextBoxFlag xmlns:ma14="http://schemas.microsoft.com/office/mac/drawingml/2011/main" xmlns:a14="http://schemas.microsoft.com/office/drawing/2010/main" xmlns:m="http://schemas.openxmlformats.org/officeDocument/2006/math" xmlns="" val="1"/>
+              <ma14:wrappingTextBoxFlag xmlns="" xmlns:m="http://schemas.openxmlformats.org/officeDocument/2006/math" xmlns:a14="http://schemas.microsoft.com/office/drawing/2010/main" xmlns:ma14="http://schemas.microsoft.com/office/mac/drawingml/2011/main" val="1"/>
             </a:ext>
           </a:extLst>
         </p:spPr>
@@ -28986,7 +29139,7 @@
             </a:pPr>
             <a:r>
               <a:rPr sz="2000" dirty="0"/>
-              <a:t>No up-front commitment</a:t>
+              <a:t>Scalability</a:t>
             </a:r>
           </a:p>
           <a:p>
@@ -28998,35 +29151,17 @@
             </a:pPr>
             <a:r>
               <a:rPr sz="2000" dirty="0"/>
-              <a:t>No investment in </a:t>
+              <a:t>Thousands of </a:t>
             </a:r>
             <a:r>
               <a:rPr lang="en-AU" sz="2000" dirty="0"/>
-              <a:t>data </a:t>
-            </a:r>
-            <a:r>
-              <a:rPr lang="en-AU" sz="2000" dirty="0" err="1"/>
-              <a:t>centers</a:t>
-            </a:r>
-            <a:r>
-              <a:rPr lang="en-AU" sz="2000" dirty="0"/>
-              <a:t>, enabling </a:t>
+              <a:t>servers </a:t>
             </a:r>
             <a:r>
               <a:rPr sz="2000" dirty="0"/>
-              <a:t>pay-as-you-go</a:t>
-            </a:r>
-          </a:p>
-          <a:p>
-            <a:pPr>
-              <a:lnSpc>
-                <a:spcPct val="81000"/>
-              </a:lnSpc>
-            </a:pPr>
-            <a:r>
-              <a:rPr sz="2000" dirty="0"/>
-              <a:t>Scalability</a:t>
-            </a:r>
+              <a:t>available on demand</a:t>
+            </a:r>
+            <a:endParaRPr lang="en-AU" sz="2000" dirty="0"/>
           </a:p>
           <a:p>
             <a:pPr lvl="1">
@@ -29036,18 +29171,33 @@
               <a:defRPr sz="2400"/>
             </a:pPr>
             <a:r>
+              <a:rPr lang="en-AU" sz="2000" dirty="0"/>
+              <a:t>A</a:t>
+            </a:r>
+            <a:r>
               <a:rPr sz="2000" dirty="0"/>
-              <a:t>Thousands of </a:t>
+              <a:t>dd</a:t>
             </a:r>
             <a:r>
               <a:rPr lang="en-AU" sz="2000" dirty="0"/>
-              <a:t>servers </a:t>
+              <a:t> </a:t>
             </a:r>
             <a:r>
               <a:rPr sz="2000" dirty="0"/>
-              <a:t>available on demand</a:t>
+              <a:t>more within seconds</a:t>
             </a:r>
             <a:endParaRPr lang="en-AU" sz="2000" dirty="0"/>
+          </a:p>
+          <a:p>
+            <a:pPr>
+              <a:lnSpc>
+                <a:spcPct val="81000"/>
+              </a:lnSpc>
+            </a:pPr>
+            <a:r>
+              <a:rPr lang="en-US" sz="2000" dirty="0"/>
+              <a:t>No up-front commitment</a:t>
+            </a:r>
           </a:p>
           <a:p>
             <a:pPr lvl="1">
@@ -29057,20 +29207,8 @@
               <a:defRPr sz="2400"/>
             </a:pPr>
             <a:r>
-              <a:rPr lang="en-AU" sz="2000" dirty="0"/>
-              <a:t>A</a:t>
-            </a:r>
-            <a:r>
-              <a:rPr sz="2000" dirty="0"/>
-              <a:t>dd</a:t>
-            </a:r>
-            <a:r>
-              <a:rPr lang="en-AU" sz="2000" dirty="0"/>
-              <a:t> </a:t>
-            </a:r>
-            <a:r>
-              <a:rPr sz="2000" dirty="0"/>
-              <a:t>more within seconds</a:t>
+              <a:rPr lang="en-US" sz="2000" dirty="0"/>
+              <a:t>No investment in data centers, enabling pay-as-you-go</a:t>
             </a:r>
           </a:p>
         </p:txBody>
@@ -29789,12 +29927,18 @@
               <a:defRPr sz="2200"/>
             </a:pPr>
             <a:r>
+              <a:rPr lang="en-AU" sz="2000" dirty="0"/>
+              <a:t>Most</a:t>
+            </a:r>
+            <a:r>
               <a:rPr sz="2000" dirty="0"/>
-              <a:t>Some web services run on clouds, but not all</a:t>
-            </a:r>
-          </a:p>
-          <a:p>
-            <a:pPr lvl="1">
+              <a:t> web services run on clouds</a:t>
+            </a:r>
+            <a:endParaRPr lang="en-AU" sz="2000" dirty="0"/>
+          </a:p>
+          <a:p>
+            <a:pPr marL="342900" lvl="1" indent="0">
+              <a:buNone/>
               <a:defRPr sz="2200"/>
             </a:pPr>
             <a:endParaRPr sz="2000" dirty="0"/>
@@ -30224,7 +30368,7 @@
           </a:ln>
           <a:extLst>
             <a:ext uri="{C572A759-6A51-4108-AA02-DFA0A04FC94B}">
-              <ma14:wrappingTextBoxFlag xmlns:ma14="http://schemas.microsoft.com/office/mac/drawingml/2011/main" xmlns:a14="http://schemas.microsoft.com/office/drawing/2010/main" xmlns:m="http://schemas.openxmlformats.org/officeDocument/2006/math" xmlns="" val="1"/>
+              <ma14:wrappingTextBoxFlag xmlns="" xmlns:m="http://schemas.openxmlformats.org/officeDocument/2006/math" xmlns:a14="http://schemas.microsoft.com/office/drawing/2010/main" xmlns:ma14="http://schemas.microsoft.com/office/mac/drawingml/2011/main" val="1"/>
             </a:ext>
           </a:extLst>
         </p:spPr>
@@ -32519,7 +32663,7 @@
             </a:r>
             <a:r>
               <a:rPr lang="en-US" sz="2200" dirty="0"/>
-              <a:t>Cloud computing provides multi-tenant environments by allocating resources efficiently for different users, e.g., some tasks are computing intensive while some other are memory intensive.</a:t>
+              <a:t>Cloud computing provides multi-tenant environments by allocating resources efficiently for different users, e.g., some tasks are computing intensive while some others are memory intensive.</a:t>
             </a:r>
             <a:endParaRPr lang="en-AU" sz="2200" dirty="0"/>
           </a:p>

</xml_diff>